<commit_message>
Updated Report and slideshow
</commit_message>
<xml_diff>
--- a/EM-Explanation/Méthode Probabiliste.pptx
+++ b/EM-Explanation/Méthode Probabiliste.pptx
@@ -251,7 +251,7 @@
             <a:pPr rtl="0"/>
             <a:fld id="{C402F678-F322-436F-969F-581A681A4022}" type="datetime1">
               <a:rPr lang="en-GB" smtClean="0"/>
-              <a:t>24/01/2024</a:t>
+              <a:t>12/02/2024</a:t>
             </a:fld>
             <a:endParaRPr lang="en-GB" dirty="0"/>
           </a:p>
@@ -429,7 +429,7 @@
             <a:pPr rtl="0"/>
             <a:fld id="{F5F85D5D-D531-4EF4-BBA5-13F53735D17A}" type="datetime1">
               <a:rPr lang="en-GB" noProof="0" smtClean="0"/>
-              <a:t>24/01/2024</a:t>
+              <a:t>12/02/2024</a:t>
             </a:fld>
             <a:endParaRPr lang="en-GB" noProof="0" dirty="0"/>
           </a:p>
@@ -3004,7 +3004,7 @@
             <a:pPr rtl="0"/>
             <a:fld id="{4553D316-16AB-42CE-89B2-F5A42FA03291}" type="datetime1">
               <a:rPr lang="en-GB" noProof="0" smtClean="0"/>
-              <a:t>24/01/2024</a:t>
+              <a:t>12/02/2024</a:t>
             </a:fld>
             <a:endParaRPr lang="en-GB" noProof="0" dirty="0"/>
           </a:p>
@@ -3231,7 +3231,7 @@
             <a:pPr rtl="0"/>
             <a:fld id="{575E590D-3E1C-4529-9FEB-6819CB8D64A4}" type="datetime1">
               <a:rPr lang="en-GB" noProof="0" smtClean="0"/>
-              <a:t>24/01/2024</a:t>
+              <a:t>12/02/2024</a:t>
             </a:fld>
             <a:endParaRPr lang="en-GB" noProof="0" dirty="0"/>
           </a:p>
@@ -4053,7 +4053,7 @@
             <a:pPr rtl="0"/>
             <a:fld id="{200C96D0-FA2C-4E12-9A01-4FB6EBCFF224}" type="datetime1">
               <a:rPr lang="en-GB" noProof="0" smtClean="0"/>
-              <a:t>24/01/2024</a:t>
+              <a:t>12/02/2024</a:t>
             </a:fld>
             <a:endParaRPr lang="en-GB" noProof="0" dirty="0"/>
           </a:p>
@@ -4258,7 +4258,7 @@
             <a:pPr rtl="0"/>
             <a:fld id="{22D90D2D-092C-49A5-8BDF-9B6C10AEC9FC}" type="datetime1">
               <a:rPr lang="en-GB" noProof="0" smtClean="0"/>
-              <a:t>24/01/2024</a:t>
+              <a:t>12/02/2024</a:t>
             </a:fld>
             <a:endParaRPr lang="en-GB" noProof="0" dirty="0"/>
           </a:p>
@@ -5527,7 +5527,7 @@
             <a:pPr rtl="0"/>
             <a:fld id="{3D514119-688F-4086-B70F-3CB79DC41DC9}" type="datetime1">
               <a:rPr lang="en-GB" noProof="0" smtClean="0"/>
-              <a:t>24/01/2024</a:t>
+              <a:t>12/02/2024</a:t>
             </a:fld>
             <a:endParaRPr lang="en-GB" noProof="0" dirty="0"/>
           </a:p>
@@ -5856,7 +5856,7 @@
             <a:pPr rtl="0"/>
             <a:fld id="{057B89F6-C2AB-4CD5-9F8D-55CF144CE776}" type="datetime1">
               <a:rPr lang="en-GB" noProof="0" smtClean="0"/>
-              <a:t>24/01/2024</a:t>
+              <a:t>12/02/2024</a:t>
             </a:fld>
             <a:endParaRPr lang="en-GB" noProof="0" dirty="0"/>
           </a:p>
@@ -6311,7 +6311,7 @@
             <a:pPr rtl="0"/>
             <a:fld id="{A097697C-5D26-4A25-83C8-130BCFF33A0F}" type="datetime1">
               <a:rPr lang="en-GB" noProof="0" smtClean="0"/>
-              <a:t>24/01/2024</a:t>
+              <a:t>12/02/2024</a:t>
             </a:fld>
             <a:endParaRPr lang="en-GB" noProof="0" dirty="0"/>
           </a:p>
@@ -6448,7 +6448,7 @@
             <a:pPr rtl="0"/>
             <a:fld id="{35CAEDCB-3F75-4B4A-ABAC-AA9986258E89}" type="datetime1">
               <a:rPr lang="en-GB" noProof="0" smtClean="0"/>
-              <a:t>24/01/2024</a:t>
+              <a:t>12/02/2024</a:t>
             </a:fld>
             <a:endParaRPr lang="en-GB" noProof="0" dirty="0"/>
           </a:p>
@@ -6789,7 +6789,7 @@
             <a:pPr rtl="0"/>
             <a:fld id="{2554A435-6A9B-478B-BAEF-B997D7A6F641}" type="datetime1">
               <a:rPr lang="en-GB" noProof="0" smtClean="0"/>
-              <a:t>24/01/2024</a:t>
+              <a:t>12/02/2024</a:t>
             </a:fld>
             <a:endParaRPr lang="en-GB" noProof="0" dirty="0"/>
           </a:p>
@@ -7288,7 +7288,7 @@
             <a:pPr rtl="0"/>
             <a:fld id="{AEC45E7A-6BB3-4EC9-BCE8-88D7CA65CEB9}" type="datetime1">
               <a:rPr lang="en-GB" noProof="0" smtClean="0"/>
-              <a:t>24/01/2024</a:t>
+              <a:t>12/02/2024</a:t>
             </a:fld>
             <a:endParaRPr lang="en-GB" noProof="0" dirty="0"/>
           </a:p>
@@ -7744,7 +7744,7 @@
             <a:pPr rtl="0"/>
             <a:fld id="{1F4033CC-F025-4A3E-9666-3EBD09C60920}" type="datetime1">
               <a:rPr lang="en-GB" noProof="0" smtClean="0"/>
-              <a:t>24/01/2024</a:t>
+              <a:t>12/02/2024</a:t>
             </a:fld>
             <a:endParaRPr lang="en-GB" noProof="0" dirty="0"/>
           </a:p>
@@ -8649,7 +8649,7 @@
             <a:pPr rtl="0"/>
             <a:fld id="{00D867F5-F25C-4334-BEFF-CCB24DBFBEDC}" type="datetime1">
               <a:rPr lang="en-GB" noProof="0" smtClean="0"/>
-              <a:t>24/01/2024</a:t>
+              <a:t>12/02/2024</a:t>
             </a:fld>
             <a:endParaRPr lang="en-GB" noProof="0" dirty="0"/>
           </a:p>
@@ -9557,13 +9557,13 @@
   <p:clrMapOvr>
     <a:masterClrMapping/>
   </p:clrMapOvr>
-  <mc:AlternateContent xmlns:mc="http://schemas.openxmlformats.org/markup-compatibility/2006">
-    <mc:Choice xmlns:p14="http://schemas.microsoft.com/office/powerpoint/2010/main" Requires="p14">
+  <mc:AlternateContent xmlns:mc="http://schemas.openxmlformats.org/markup-compatibility/2006" xmlns:p14="http://schemas.microsoft.com/office/powerpoint/2010/main">
+    <mc:Choice Requires="p14">
       <p:transition spd="med" p14:dur="700">
         <p:fade/>
       </p:transition>
     </mc:Choice>
-    <mc:Fallback>
+    <mc:Fallback xmlns="">
       <p:transition spd="med">
         <p:fade/>
       </p:transition>
@@ -12408,7 +12408,40 @@
                 <a:latin typeface="Cambria Math" panose="02040503050406030204" pitchFamily="18" charset="0"/>
                 <a:ea typeface="Cambria Math" panose="02040503050406030204" pitchFamily="18" charset="0"/>
               </a:rPr>
-              <a:t>) est une méthode probabiliste pour l'apprentissage non supervisé qui utilise des modèles de mélange gaussien. Dans notre comparaison de deux ensembles de données, nous pouvons conclure que la méthode des k-moyennes semble être plus précise pour le regroupement que l'algorithme EM. Cela prouve les limites de l'algorithme EM qui est probablement dû à la convergence vers des maxima locaux.</a:t>
+              <a:t>) est une méthode probabiliste pour l'apprentissage non supervisé qui utilise des modèles de mélange gaussien. Dans notre comparaison de deux ensembles de données, nous pouvons conclure que </a:t>
+            </a:r>
+            <a:r>
+              <a:rPr lang="fr-FR" dirty="0"/>
+              <a:t>l’algorithme K-</a:t>
+            </a:r>
+            <a:r>
+              <a:rPr lang="fr-FR" dirty="0" err="1"/>
+              <a:t>means</a:t>
+            </a:r>
+            <a:r>
+              <a:rPr lang="fr-FR" dirty="0"/>
+              <a:t> </a:t>
+            </a:r>
+            <a:r>
+              <a:rPr lang="fr-FR" dirty="0">
+                <a:latin typeface="Cambria Math" panose="02040503050406030204" pitchFamily="18" charset="0"/>
+                <a:ea typeface="Cambria Math" panose="02040503050406030204" pitchFamily="18" charset="0"/>
+              </a:rPr>
+              <a:t>semble être plus précise pour </a:t>
+            </a:r>
+            <a:r>
+              <a:rPr lang="fr-FR">
+                <a:latin typeface="Cambria Math" panose="02040503050406030204" pitchFamily="18" charset="0"/>
+                <a:ea typeface="Cambria Math" panose="02040503050406030204" pitchFamily="18" charset="0"/>
+              </a:rPr>
+              <a:t>le clustering </a:t>
+            </a:r>
+            <a:r>
+              <a:rPr lang="fr-FR" dirty="0">
+                <a:latin typeface="Cambria Math" panose="02040503050406030204" pitchFamily="18" charset="0"/>
+                <a:ea typeface="Cambria Math" panose="02040503050406030204" pitchFamily="18" charset="0"/>
+              </a:rPr>
+              <a:t>que l'algorithme EM. Cela prouve les limites de l'algorithme EM qui est probablement dû à la convergence vers des maxima locaux.</a:t>
             </a:r>
             <a:endParaRPr lang="en-GB" dirty="0">
               <a:latin typeface="Cambria Math" panose="02040503050406030204" pitchFamily="18" charset="0"/>
@@ -13573,13 +13606,13 @@
   <p:clrMapOvr>
     <a:masterClrMapping/>
   </p:clrMapOvr>
-  <mc:AlternateContent xmlns:mc="http://schemas.openxmlformats.org/markup-compatibility/2006">
-    <mc:Choice xmlns:p14="http://schemas.microsoft.com/office/powerpoint/2010/main" Requires="p14">
+  <mc:AlternateContent xmlns:mc="http://schemas.openxmlformats.org/markup-compatibility/2006" xmlns:p14="http://schemas.microsoft.com/office/powerpoint/2010/main">
+    <mc:Choice Requires="p14">
       <p:transition spd="med" p14:dur="700">
         <p:fade/>
       </p:transition>
     </mc:Choice>
-    <mc:Fallback>
+    <mc:Fallback xmlns="">
       <p:transition spd="med">
         <p:fade/>
       </p:transition>
@@ -15151,7 +15184,21 @@
                         <a:latin typeface="Cambria Math" panose="02040503050406030204" pitchFamily="18" charset="0"/>
                         <a:ea typeface="Cambria Math" panose="02040503050406030204" pitchFamily="18" charset="0"/>
                       </a:rPr>
-                      <m:t>𝑀𝑢𝑙𝑡𝑖𝑛𝑜𝑚𝑖𝑎𝑙𝑒</m:t>
+                      <m:t>𝐶𝑎𝑡</m:t>
+                    </m:r>
+                    <m:r>
+                      <a:rPr lang="en-US" sz="2400" b="0" i="1" dirty="0" smtClean="0">
+                        <a:latin typeface="Cambria Math" panose="02040503050406030204" pitchFamily="18" charset="0"/>
+                        <a:ea typeface="Cambria Math" panose="02040503050406030204" pitchFamily="18" charset="0"/>
+                      </a:rPr>
+                      <m:t>é</m:t>
+                    </m:r>
+                    <m:r>
+                      <a:rPr lang="en-US" sz="2400" b="0" i="1" dirty="0" smtClean="0">
+                        <a:latin typeface="Cambria Math" panose="02040503050406030204" pitchFamily="18" charset="0"/>
+                        <a:ea typeface="Cambria Math" panose="02040503050406030204" pitchFamily="18" charset="0"/>
+                      </a:rPr>
+                      <m:t>𝑔𝑜𝑟𝑖𝑎𝑙𝑒</m:t>
                     </m:r>
                     <m:d>
                       <m:dPr>

</xml_diff>